<commit_message>
added signal names, circuit representation, piloting from circuit, updated files to deploy and doc
</commit_message>
<xml_diff>
--- a/Docs/Creating the circuit file.pptx
+++ b/Docs/Creating the circuit file.pptx
@@ -154,10 +154,9 @@
           </a:lstStyle>
           <a:p>
             <a:r>
-              <a:rPr lang="fr-FR" smtClean="0"/>
+              <a:rPr lang="fr-FR"/>
               <a:t>Modifiez le style du titre</a:t>
             </a:r>
-            <a:endParaRPr lang="fr-FR"/>
           </a:p>
         </p:txBody>
       </p:sp>
@@ -219,10 +218,9 @@
           </a:lstStyle>
           <a:p>
             <a:r>
-              <a:rPr lang="fr-FR" smtClean="0"/>
+              <a:rPr lang="fr-FR"/>
               <a:t>Modifiez le style des sous-titres du masque</a:t>
             </a:r>
-            <a:endParaRPr lang="fr-FR"/>
           </a:p>
         </p:txBody>
       </p:sp>
@@ -243,7 +241,7 @@
           <a:p>
             <a:fld id="{84A2EA4B-0DA4-448B-B7F1-82F52D93A08E}" type="datetimeFigureOut">
               <a:rPr lang="fr-FR" smtClean="0"/>
-              <a:t>jj/11/aa</a:t>
+              <a:t>29/06/2016</a:t>
             </a:fld>
             <a:endParaRPr lang="fr-FR"/>
           </a:p>
@@ -337,10 +335,9 @@
           <a:lstStyle/>
           <a:p>
             <a:r>
-              <a:rPr lang="fr-FR" smtClean="0"/>
+              <a:rPr lang="fr-FR"/>
               <a:t>Modifiez le style du titre</a:t>
             </a:r>
-            <a:endParaRPr lang="fr-FR"/>
           </a:p>
         </p:txBody>
       </p:sp>
@@ -361,38 +358,37 @@
           <a:p>
             <a:pPr lvl="0"/>
             <a:r>
-              <a:rPr lang="fr-FR" smtClean="0"/>
+              <a:rPr lang="fr-FR"/>
               <a:t>Modifiez les styles du texte du masque</a:t>
             </a:r>
           </a:p>
           <a:p>
             <a:pPr lvl="1"/>
             <a:r>
-              <a:rPr lang="fr-FR" smtClean="0"/>
+              <a:rPr lang="fr-FR"/>
               <a:t>Deuxième niveau</a:t>
             </a:r>
           </a:p>
           <a:p>
             <a:pPr lvl="2"/>
             <a:r>
-              <a:rPr lang="fr-FR" smtClean="0"/>
+              <a:rPr lang="fr-FR"/>
               <a:t>Troisième niveau</a:t>
             </a:r>
           </a:p>
           <a:p>
             <a:pPr lvl="3"/>
             <a:r>
-              <a:rPr lang="fr-FR" smtClean="0"/>
+              <a:rPr lang="fr-FR"/>
               <a:t>Quatrième niveau</a:t>
             </a:r>
           </a:p>
           <a:p>
             <a:pPr lvl="4"/>
             <a:r>
-              <a:rPr lang="fr-FR" smtClean="0"/>
+              <a:rPr lang="fr-FR"/>
               <a:t>Cinquième niveau</a:t>
             </a:r>
-            <a:endParaRPr lang="fr-FR"/>
           </a:p>
         </p:txBody>
       </p:sp>
@@ -413,7 +409,7 @@
           <a:p>
             <a:fld id="{84A2EA4B-0DA4-448B-B7F1-82F52D93A08E}" type="datetimeFigureOut">
               <a:rPr lang="fr-FR" smtClean="0"/>
-              <a:t>jj/11/aa</a:t>
+              <a:t>29/06/2016</a:t>
             </a:fld>
             <a:endParaRPr lang="fr-FR"/>
           </a:p>
@@ -512,10 +508,9 @@
           <a:lstStyle/>
           <a:p>
             <a:r>
-              <a:rPr lang="fr-FR" smtClean="0"/>
+              <a:rPr lang="fr-FR"/>
               <a:t>Modifiez le style du titre</a:t>
             </a:r>
-            <a:endParaRPr lang="fr-FR"/>
           </a:p>
         </p:txBody>
       </p:sp>
@@ -541,38 +536,37 @@
           <a:p>
             <a:pPr lvl="0"/>
             <a:r>
-              <a:rPr lang="fr-FR" smtClean="0"/>
+              <a:rPr lang="fr-FR"/>
               <a:t>Modifiez les styles du texte du masque</a:t>
             </a:r>
           </a:p>
           <a:p>
             <a:pPr lvl="1"/>
             <a:r>
-              <a:rPr lang="fr-FR" smtClean="0"/>
+              <a:rPr lang="fr-FR"/>
               <a:t>Deuxième niveau</a:t>
             </a:r>
           </a:p>
           <a:p>
             <a:pPr lvl="2"/>
             <a:r>
-              <a:rPr lang="fr-FR" smtClean="0"/>
+              <a:rPr lang="fr-FR"/>
               <a:t>Troisième niveau</a:t>
             </a:r>
           </a:p>
           <a:p>
             <a:pPr lvl="3"/>
             <a:r>
-              <a:rPr lang="fr-FR" smtClean="0"/>
+              <a:rPr lang="fr-FR"/>
               <a:t>Quatrième niveau</a:t>
             </a:r>
           </a:p>
           <a:p>
             <a:pPr lvl="4"/>
             <a:r>
-              <a:rPr lang="fr-FR" smtClean="0"/>
+              <a:rPr lang="fr-FR"/>
               <a:t>Cinquième niveau</a:t>
             </a:r>
-            <a:endParaRPr lang="fr-FR"/>
           </a:p>
         </p:txBody>
       </p:sp>
@@ -593,7 +587,7 @@
           <a:p>
             <a:fld id="{84A2EA4B-0DA4-448B-B7F1-82F52D93A08E}" type="datetimeFigureOut">
               <a:rPr lang="fr-FR" smtClean="0"/>
-              <a:t>jj/11/aa</a:t>
+              <a:t>29/06/2016</a:t>
             </a:fld>
             <a:endParaRPr lang="fr-FR"/>
           </a:p>
@@ -687,10 +681,9 @@
           <a:lstStyle/>
           <a:p>
             <a:r>
-              <a:rPr lang="fr-FR" smtClean="0"/>
+              <a:rPr lang="fr-FR"/>
               <a:t>Modifiez le style du titre</a:t>
             </a:r>
-            <a:endParaRPr lang="fr-FR"/>
           </a:p>
         </p:txBody>
       </p:sp>
@@ -711,38 +704,37 @@
           <a:p>
             <a:pPr lvl="0"/>
             <a:r>
-              <a:rPr lang="fr-FR" smtClean="0"/>
+              <a:rPr lang="fr-FR"/>
               <a:t>Modifiez les styles du texte du masque</a:t>
             </a:r>
           </a:p>
           <a:p>
             <a:pPr lvl="1"/>
             <a:r>
-              <a:rPr lang="fr-FR" smtClean="0"/>
+              <a:rPr lang="fr-FR"/>
               <a:t>Deuxième niveau</a:t>
             </a:r>
           </a:p>
           <a:p>
             <a:pPr lvl="2"/>
             <a:r>
-              <a:rPr lang="fr-FR" smtClean="0"/>
+              <a:rPr lang="fr-FR"/>
               <a:t>Troisième niveau</a:t>
             </a:r>
           </a:p>
           <a:p>
             <a:pPr lvl="3"/>
             <a:r>
-              <a:rPr lang="fr-FR" smtClean="0"/>
+              <a:rPr lang="fr-FR"/>
               <a:t>Quatrième niveau</a:t>
             </a:r>
           </a:p>
           <a:p>
             <a:pPr lvl="4"/>
             <a:r>
-              <a:rPr lang="fr-FR" smtClean="0"/>
+              <a:rPr lang="fr-FR"/>
               <a:t>Cinquième niveau</a:t>
             </a:r>
-            <a:endParaRPr lang="fr-FR"/>
           </a:p>
         </p:txBody>
       </p:sp>
@@ -763,7 +755,7 @@
           <a:p>
             <a:fld id="{84A2EA4B-0DA4-448B-B7F1-82F52D93A08E}" type="datetimeFigureOut">
               <a:rPr lang="fr-FR" smtClean="0"/>
-              <a:t>jj/11/aa</a:t>
+              <a:t>29/06/2016</a:t>
             </a:fld>
             <a:endParaRPr lang="fr-FR"/>
           </a:p>
@@ -866,10 +858,9 @@
           </a:lstStyle>
           <a:p>
             <a:r>
-              <a:rPr lang="fr-FR" smtClean="0"/>
+              <a:rPr lang="fr-FR"/>
               <a:t>Modifiez le style du titre</a:t>
             </a:r>
-            <a:endParaRPr lang="fr-FR"/>
           </a:p>
         </p:txBody>
       </p:sp>
@@ -986,7 +977,7 @@
           <a:p>
             <a:pPr lvl="0"/>
             <a:r>
-              <a:rPr lang="fr-FR" smtClean="0"/>
+              <a:rPr lang="fr-FR"/>
               <a:t>Modifiez les styles du texte du masque</a:t>
             </a:r>
           </a:p>
@@ -1009,7 +1000,7 @@
           <a:p>
             <a:fld id="{84A2EA4B-0DA4-448B-B7F1-82F52D93A08E}" type="datetimeFigureOut">
               <a:rPr lang="fr-FR" smtClean="0"/>
-              <a:t>jj/11/aa</a:t>
+              <a:t>29/06/2016</a:t>
             </a:fld>
             <a:endParaRPr lang="fr-FR"/>
           </a:p>
@@ -1103,10 +1094,9 @@
           <a:lstStyle/>
           <a:p>
             <a:r>
-              <a:rPr lang="fr-FR" smtClean="0"/>
+              <a:rPr lang="fr-FR"/>
               <a:t>Modifiez le style du titre</a:t>
             </a:r>
-            <a:endParaRPr lang="fr-FR"/>
           </a:p>
         </p:txBody>
       </p:sp>
@@ -1132,38 +1122,37 @@
           <a:p>
             <a:pPr lvl="0"/>
             <a:r>
-              <a:rPr lang="fr-FR" smtClean="0"/>
+              <a:rPr lang="fr-FR"/>
               <a:t>Modifiez les styles du texte du masque</a:t>
             </a:r>
           </a:p>
           <a:p>
             <a:pPr lvl="1"/>
             <a:r>
-              <a:rPr lang="fr-FR" smtClean="0"/>
+              <a:rPr lang="fr-FR"/>
               <a:t>Deuxième niveau</a:t>
             </a:r>
           </a:p>
           <a:p>
             <a:pPr lvl="2"/>
             <a:r>
-              <a:rPr lang="fr-FR" smtClean="0"/>
+              <a:rPr lang="fr-FR"/>
               <a:t>Troisième niveau</a:t>
             </a:r>
           </a:p>
           <a:p>
             <a:pPr lvl="3"/>
             <a:r>
-              <a:rPr lang="fr-FR" smtClean="0"/>
+              <a:rPr lang="fr-FR"/>
               <a:t>Quatrième niveau</a:t>
             </a:r>
           </a:p>
           <a:p>
             <a:pPr lvl="4"/>
             <a:r>
-              <a:rPr lang="fr-FR" smtClean="0"/>
+              <a:rPr lang="fr-FR"/>
               <a:t>Cinquième niveau</a:t>
             </a:r>
-            <a:endParaRPr lang="fr-FR"/>
           </a:p>
         </p:txBody>
       </p:sp>
@@ -1189,38 +1178,37 @@
           <a:p>
             <a:pPr lvl="0"/>
             <a:r>
-              <a:rPr lang="fr-FR" smtClean="0"/>
+              <a:rPr lang="fr-FR"/>
               <a:t>Modifiez les styles du texte du masque</a:t>
             </a:r>
           </a:p>
           <a:p>
             <a:pPr lvl="1"/>
             <a:r>
-              <a:rPr lang="fr-FR" smtClean="0"/>
+              <a:rPr lang="fr-FR"/>
               <a:t>Deuxième niveau</a:t>
             </a:r>
           </a:p>
           <a:p>
             <a:pPr lvl="2"/>
             <a:r>
-              <a:rPr lang="fr-FR" smtClean="0"/>
+              <a:rPr lang="fr-FR"/>
               <a:t>Troisième niveau</a:t>
             </a:r>
           </a:p>
           <a:p>
             <a:pPr lvl="3"/>
             <a:r>
-              <a:rPr lang="fr-FR" smtClean="0"/>
+              <a:rPr lang="fr-FR"/>
               <a:t>Quatrième niveau</a:t>
             </a:r>
           </a:p>
           <a:p>
             <a:pPr lvl="4"/>
             <a:r>
-              <a:rPr lang="fr-FR" smtClean="0"/>
+              <a:rPr lang="fr-FR"/>
               <a:t>Cinquième niveau</a:t>
             </a:r>
-            <a:endParaRPr lang="fr-FR"/>
           </a:p>
         </p:txBody>
       </p:sp>
@@ -1241,7 +1229,7 @@
           <a:p>
             <a:fld id="{84A2EA4B-0DA4-448B-B7F1-82F52D93A08E}" type="datetimeFigureOut">
               <a:rPr lang="fr-FR" smtClean="0"/>
-              <a:t>jj/11/aa</a:t>
+              <a:t>29/06/2016</a:t>
             </a:fld>
             <a:endParaRPr lang="fr-FR"/>
           </a:p>
@@ -1340,10 +1328,9 @@
           <a:lstStyle/>
           <a:p>
             <a:r>
-              <a:rPr lang="fr-FR" smtClean="0"/>
+              <a:rPr lang="fr-FR"/>
               <a:t>Modifiez le style du titre</a:t>
             </a:r>
-            <a:endParaRPr lang="fr-FR"/>
           </a:p>
         </p:txBody>
       </p:sp>
@@ -1406,7 +1393,7 @@
           <a:p>
             <a:pPr lvl="0"/>
             <a:r>
-              <a:rPr lang="fr-FR" smtClean="0"/>
+              <a:rPr lang="fr-FR"/>
               <a:t>Modifiez les styles du texte du masque</a:t>
             </a:r>
           </a:p>
@@ -1434,38 +1421,37 @@
           <a:p>
             <a:pPr lvl="0"/>
             <a:r>
-              <a:rPr lang="fr-FR" smtClean="0"/>
+              <a:rPr lang="fr-FR"/>
               <a:t>Modifiez les styles du texte du masque</a:t>
             </a:r>
           </a:p>
           <a:p>
             <a:pPr lvl="1"/>
             <a:r>
-              <a:rPr lang="fr-FR" smtClean="0"/>
+              <a:rPr lang="fr-FR"/>
               <a:t>Deuxième niveau</a:t>
             </a:r>
           </a:p>
           <a:p>
             <a:pPr lvl="2"/>
             <a:r>
-              <a:rPr lang="fr-FR" smtClean="0"/>
+              <a:rPr lang="fr-FR"/>
               <a:t>Troisième niveau</a:t>
             </a:r>
           </a:p>
           <a:p>
             <a:pPr lvl="3"/>
             <a:r>
-              <a:rPr lang="fr-FR" smtClean="0"/>
+              <a:rPr lang="fr-FR"/>
               <a:t>Quatrième niveau</a:t>
             </a:r>
           </a:p>
           <a:p>
             <a:pPr lvl="4"/>
             <a:r>
-              <a:rPr lang="fr-FR" smtClean="0"/>
+              <a:rPr lang="fr-FR"/>
               <a:t>Cinquième niveau</a:t>
             </a:r>
-            <a:endParaRPr lang="fr-FR"/>
           </a:p>
         </p:txBody>
       </p:sp>
@@ -1528,7 +1514,7 @@
           <a:p>
             <a:pPr lvl="0"/>
             <a:r>
-              <a:rPr lang="fr-FR" smtClean="0"/>
+              <a:rPr lang="fr-FR"/>
               <a:t>Modifiez les styles du texte du masque</a:t>
             </a:r>
           </a:p>
@@ -1556,38 +1542,37 @@
           <a:p>
             <a:pPr lvl="0"/>
             <a:r>
-              <a:rPr lang="fr-FR" smtClean="0"/>
+              <a:rPr lang="fr-FR"/>
               <a:t>Modifiez les styles du texte du masque</a:t>
             </a:r>
           </a:p>
           <a:p>
             <a:pPr lvl="1"/>
             <a:r>
-              <a:rPr lang="fr-FR" smtClean="0"/>
+              <a:rPr lang="fr-FR"/>
               <a:t>Deuxième niveau</a:t>
             </a:r>
           </a:p>
           <a:p>
             <a:pPr lvl="2"/>
             <a:r>
-              <a:rPr lang="fr-FR" smtClean="0"/>
+              <a:rPr lang="fr-FR"/>
               <a:t>Troisième niveau</a:t>
             </a:r>
           </a:p>
           <a:p>
             <a:pPr lvl="3"/>
             <a:r>
-              <a:rPr lang="fr-FR" smtClean="0"/>
+              <a:rPr lang="fr-FR"/>
               <a:t>Quatrième niveau</a:t>
             </a:r>
           </a:p>
           <a:p>
             <a:pPr lvl="4"/>
             <a:r>
-              <a:rPr lang="fr-FR" smtClean="0"/>
+              <a:rPr lang="fr-FR"/>
               <a:t>Cinquième niveau</a:t>
             </a:r>
-            <a:endParaRPr lang="fr-FR"/>
           </a:p>
         </p:txBody>
       </p:sp>
@@ -1608,7 +1593,7 @@
           <a:p>
             <a:fld id="{84A2EA4B-0DA4-448B-B7F1-82F52D93A08E}" type="datetimeFigureOut">
               <a:rPr lang="fr-FR" smtClean="0"/>
-              <a:t>jj/11/aa</a:t>
+              <a:t>29/06/2016</a:t>
             </a:fld>
             <a:endParaRPr lang="fr-FR"/>
           </a:p>
@@ -1702,10 +1687,9 @@
           <a:lstStyle/>
           <a:p>
             <a:r>
-              <a:rPr lang="fr-FR" smtClean="0"/>
+              <a:rPr lang="fr-FR"/>
               <a:t>Modifiez le style du titre</a:t>
             </a:r>
-            <a:endParaRPr lang="fr-FR"/>
           </a:p>
         </p:txBody>
       </p:sp>
@@ -1726,7 +1710,7 @@
           <a:p>
             <a:fld id="{84A2EA4B-0DA4-448B-B7F1-82F52D93A08E}" type="datetimeFigureOut">
               <a:rPr lang="fr-FR" smtClean="0"/>
-              <a:t>jj/11/aa</a:t>
+              <a:t>29/06/2016</a:t>
             </a:fld>
             <a:endParaRPr lang="fr-FR"/>
           </a:p>
@@ -1821,7 +1805,7 @@
           <a:p>
             <a:fld id="{84A2EA4B-0DA4-448B-B7F1-82F52D93A08E}" type="datetimeFigureOut">
               <a:rPr lang="fr-FR" smtClean="0"/>
-              <a:t>jj/11/aa</a:t>
+              <a:t>29/06/2016</a:t>
             </a:fld>
             <a:endParaRPr lang="fr-FR"/>
           </a:p>
@@ -1924,10 +1908,9 @@
           </a:lstStyle>
           <a:p>
             <a:r>
-              <a:rPr lang="fr-FR" smtClean="0"/>
+              <a:rPr lang="fr-FR"/>
               <a:t>Modifiez le style du titre</a:t>
             </a:r>
-            <a:endParaRPr lang="fr-FR"/>
           </a:p>
         </p:txBody>
       </p:sp>
@@ -1981,38 +1964,37 @@
           <a:p>
             <a:pPr lvl="0"/>
             <a:r>
-              <a:rPr lang="fr-FR" smtClean="0"/>
+              <a:rPr lang="fr-FR"/>
               <a:t>Modifiez les styles du texte du masque</a:t>
             </a:r>
           </a:p>
           <a:p>
             <a:pPr lvl="1"/>
             <a:r>
-              <a:rPr lang="fr-FR" smtClean="0"/>
+              <a:rPr lang="fr-FR"/>
               <a:t>Deuxième niveau</a:t>
             </a:r>
           </a:p>
           <a:p>
             <a:pPr lvl="2"/>
             <a:r>
-              <a:rPr lang="fr-FR" smtClean="0"/>
+              <a:rPr lang="fr-FR"/>
               <a:t>Troisième niveau</a:t>
             </a:r>
           </a:p>
           <a:p>
             <a:pPr lvl="3"/>
             <a:r>
-              <a:rPr lang="fr-FR" smtClean="0"/>
+              <a:rPr lang="fr-FR"/>
               <a:t>Quatrième niveau</a:t>
             </a:r>
           </a:p>
           <a:p>
             <a:pPr lvl="4"/>
             <a:r>
-              <a:rPr lang="fr-FR" smtClean="0"/>
+              <a:rPr lang="fr-FR"/>
               <a:t>Cinquième niveau</a:t>
             </a:r>
-            <a:endParaRPr lang="fr-FR"/>
           </a:p>
         </p:txBody>
       </p:sp>
@@ -2075,7 +2057,7 @@
           <a:p>
             <a:pPr lvl="0"/>
             <a:r>
-              <a:rPr lang="fr-FR" smtClean="0"/>
+              <a:rPr lang="fr-FR"/>
               <a:t>Modifiez les styles du texte du masque</a:t>
             </a:r>
           </a:p>
@@ -2098,7 +2080,7 @@
           <a:p>
             <a:fld id="{84A2EA4B-0DA4-448B-B7F1-82F52D93A08E}" type="datetimeFigureOut">
               <a:rPr lang="fr-FR" smtClean="0"/>
-              <a:t>jj/11/aa</a:t>
+              <a:t>29/06/2016</a:t>
             </a:fld>
             <a:endParaRPr lang="fr-FR"/>
           </a:p>
@@ -2201,10 +2183,9 @@
           </a:lstStyle>
           <a:p>
             <a:r>
-              <a:rPr lang="fr-FR" smtClean="0"/>
+              <a:rPr lang="fr-FR"/>
               <a:t>Modifiez le style du titre</a:t>
             </a:r>
-            <a:endParaRPr lang="fr-FR"/>
           </a:p>
         </p:txBody>
       </p:sp>
@@ -2328,7 +2309,7 @@
           <a:p>
             <a:pPr lvl="0"/>
             <a:r>
-              <a:rPr lang="fr-FR" smtClean="0"/>
+              <a:rPr lang="fr-FR"/>
               <a:t>Modifiez les styles du texte du masque</a:t>
             </a:r>
           </a:p>
@@ -2351,7 +2332,7 @@
           <a:p>
             <a:fld id="{84A2EA4B-0DA4-448B-B7F1-82F52D93A08E}" type="datetimeFigureOut">
               <a:rPr lang="fr-FR" smtClean="0"/>
-              <a:t>jj/11/aa</a:t>
+              <a:t>29/06/2016</a:t>
             </a:fld>
             <a:endParaRPr lang="fr-FR"/>
           </a:p>
@@ -2460,10 +2441,9 @@
           <a:lstStyle/>
           <a:p>
             <a:r>
-              <a:rPr lang="fr-FR" smtClean="0"/>
+              <a:rPr lang="fr-FR"/>
               <a:t>Modifiez le style du titre</a:t>
             </a:r>
-            <a:endParaRPr lang="fr-FR"/>
           </a:p>
         </p:txBody>
       </p:sp>
@@ -2494,38 +2474,37 @@
           <a:p>
             <a:pPr lvl="0"/>
             <a:r>
-              <a:rPr lang="fr-FR" smtClean="0"/>
+              <a:rPr lang="fr-FR"/>
               <a:t>Modifiez les styles du texte du masque</a:t>
             </a:r>
           </a:p>
           <a:p>
             <a:pPr lvl="1"/>
             <a:r>
-              <a:rPr lang="fr-FR" smtClean="0"/>
+              <a:rPr lang="fr-FR"/>
               <a:t>Deuxième niveau</a:t>
             </a:r>
           </a:p>
           <a:p>
             <a:pPr lvl="2"/>
             <a:r>
-              <a:rPr lang="fr-FR" smtClean="0"/>
+              <a:rPr lang="fr-FR"/>
               <a:t>Troisième niveau</a:t>
             </a:r>
           </a:p>
           <a:p>
             <a:pPr lvl="3"/>
             <a:r>
-              <a:rPr lang="fr-FR" smtClean="0"/>
+              <a:rPr lang="fr-FR"/>
               <a:t>Quatrième niveau</a:t>
             </a:r>
           </a:p>
           <a:p>
             <a:pPr lvl="4"/>
             <a:r>
-              <a:rPr lang="fr-FR" smtClean="0"/>
+              <a:rPr lang="fr-FR"/>
               <a:t>Cinquième niveau</a:t>
             </a:r>
-            <a:endParaRPr lang="fr-FR"/>
           </a:p>
         </p:txBody>
       </p:sp>
@@ -2564,7 +2543,7 @@
           <a:p>
             <a:fld id="{84A2EA4B-0DA4-448B-B7F1-82F52D93A08E}" type="datetimeFigureOut">
               <a:rPr lang="fr-FR" smtClean="0"/>
-              <a:t>jj/11/aa</a:t>
+              <a:t>29/06/2016</a:t>
             </a:fld>
             <a:endParaRPr lang="fr-FR"/>
           </a:p>
@@ -2969,6 +2948,54 @@
           <a:chExt cx="0" cy="0"/>
         </a:xfrm>
       </p:grpSpPr>
+      <p:sp>
+        <p:nvSpPr>
+          <p:cNvPr id="9" name="Rectangle : coins arrondis 8"/>
+          <p:cNvSpPr/>
+          <p:nvPr/>
+        </p:nvSpPr>
+        <p:spPr>
+          <a:xfrm>
+            <a:off x="8003097" y="1820412"/>
+            <a:ext cx="272496" cy="538980"/>
+          </a:xfrm>
+          <a:prstGeom prst="roundRect">
+            <a:avLst/>
+          </a:prstGeom>
+          <a:solidFill>
+            <a:schemeClr val="bg1"/>
+          </a:solidFill>
+          <a:ln>
+            <a:solidFill>
+              <a:schemeClr val="tx1"/>
+            </a:solidFill>
+          </a:ln>
+        </p:spPr>
+        <p:style>
+          <a:lnRef idx="2">
+            <a:schemeClr val="accent1">
+              <a:shade val="50000"/>
+            </a:schemeClr>
+          </a:lnRef>
+          <a:fillRef idx="1">
+            <a:schemeClr val="accent1"/>
+          </a:fillRef>
+          <a:effectRef idx="0">
+            <a:schemeClr val="accent1"/>
+          </a:effectRef>
+          <a:fontRef idx="minor">
+            <a:schemeClr val="lt1"/>
+          </a:fontRef>
+        </p:style>
+        <p:txBody>
+          <a:bodyPr rtlCol="0" anchor="ctr"/>
+          <a:lstStyle/>
+          <a:p>
+            <a:pPr algn="ctr"/>
+            <a:endParaRPr lang="en-US" dirty="0"/>
+          </a:p>
+        </p:txBody>
+      </p:sp>
       <p:cxnSp>
         <p:nvCxnSpPr>
           <p:cNvPr id="53" name="Connecteur droit 52"/>
@@ -4582,6 +4609,246 @@
           <a:p>
             <a:pPr algn="ctr"/>
             <a:endParaRPr lang="fr-FR"/>
+          </a:p>
+        </p:txBody>
+      </p:sp>
+      <p:sp>
+        <p:nvSpPr>
+          <p:cNvPr id="4" name="Ellipse 3"/>
+          <p:cNvSpPr/>
+          <p:nvPr/>
+        </p:nvSpPr>
+        <p:spPr>
+          <a:xfrm>
+            <a:off x="8072961" y="1909161"/>
+            <a:ext cx="144734" cy="150637"/>
+          </a:xfrm>
+          <a:prstGeom prst="ellipse">
+            <a:avLst/>
+          </a:prstGeom>
+          <a:solidFill>
+            <a:srgbClr val="FF0000"/>
+          </a:solidFill>
+          <a:ln>
+            <a:solidFill>
+              <a:schemeClr val="tx1"/>
+            </a:solidFill>
+          </a:ln>
+        </p:spPr>
+        <p:style>
+          <a:lnRef idx="2">
+            <a:schemeClr val="accent1">
+              <a:shade val="50000"/>
+            </a:schemeClr>
+          </a:lnRef>
+          <a:fillRef idx="1">
+            <a:schemeClr val="accent1"/>
+          </a:fillRef>
+          <a:effectRef idx="0">
+            <a:schemeClr val="accent1"/>
+          </a:effectRef>
+          <a:fontRef idx="minor">
+            <a:schemeClr val="lt1"/>
+          </a:fontRef>
+        </p:style>
+        <p:txBody>
+          <a:bodyPr rtlCol="0" anchor="ctr"/>
+          <a:lstStyle/>
+          <a:p>
+            <a:pPr algn="ctr"/>
+            <a:endParaRPr lang="en-US"/>
+          </a:p>
+        </p:txBody>
+      </p:sp>
+      <p:sp>
+        <p:nvSpPr>
+          <p:cNvPr id="60" name="Ellipse 59"/>
+          <p:cNvSpPr/>
+          <p:nvPr/>
+        </p:nvSpPr>
+        <p:spPr>
+          <a:xfrm>
+            <a:off x="8072960" y="2131740"/>
+            <a:ext cx="144734" cy="150637"/>
+          </a:xfrm>
+          <a:prstGeom prst="ellipse">
+            <a:avLst/>
+          </a:prstGeom>
+          <a:solidFill>
+            <a:schemeClr val="bg1"/>
+          </a:solidFill>
+          <a:ln>
+            <a:solidFill>
+              <a:schemeClr val="tx1"/>
+            </a:solidFill>
+          </a:ln>
+        </p:spPr>
+        <p:style>
+          <a:lnRef idx="2">
+            <a:schemeClr val="accent1">
+              <a:shade val="50000"/>
+            </a:schemeClr>
+          </a:lnRef>
+          <a:fillRef idx="1">
+            <a:schemeClr val="accent1"/>
+          </a:fillRef>
+          <a:effectRef idx="0">
+            <a:schemeClr val="accent1"/>
+          </a:effectRef>
+          <a:fontRef idx="minor">
+            <a:schemeClr val="lt1"/>
+          </a:fontRef>
+        </p:style>
+        <p:txBody>
+          <a:bodyPr rtlCol="0" anchor="ctr"/>
+          <a:lstStyle/>
+          <a:p>
+            <a:pPr algn="ctr"/>
+            <a:endParaRPr lang="en-US"/>
+          </a:p>
+        </p:txBody>
+      </p:sp>
+      <p:sp>
+        <p:nvSpPr>
+          <p:cNvPr id="66" name="Rectangle : coins arrondis 65"/>
+          <p:cNvSpPr/>
+          <p:nvPr/>
+        </p:nvSpPr>
+        <p:spPr>
+          <a:xfrm>
+            <a:off x="8465060" y="1829302"/>
+            <a:ext cx="272496" cy="538980"/>
+          </a:xfrm>
+          <a:prstGeom prst="roundRect">
+            <a:avLst/>
+          </a:prstGeom>
+          <a:solidFill>
+            <a:schemeClr val="bg1"/>
+          </a:solidFill>
+          <a:ln>
+            <a:solidFill>
+              <a:schemeClr val="tx1"/>
+            </a:solidFill>
+          </a:ln>
+        </p:spPr>
+        <p:style>
+          <a:lnRef idx="2">
+            <a:schemeClr val="accent1">
+              <a:shade val="50000"/>
+            </a:schemeClr>
+          </a:lnRef>
+          <a:fillRef idx="1">
+            <a:schemeClr val="accent1"/>
+          </a:fillRef>
+          <a:effectRef idx="0">
+            <a:schemeClr val="accent1"/>
+          </a:effectRef>
+          <a:fontRef idx="minor">
+            <a:schemeClr val="lt1"/>
+          </a:fontRef>
+        </p:style>
+        <p:txBody>
+          <a:bodyPr rtlCol="0" anchor="ctr"/>
+          <a:lstStyle/>
+          <a:p>
+            <a:pPr algn="ctr"/>
+            <a:endParaRPr lang="en-US" dirty="0"/>
+          </a:p>
+        </p:txBody>
+      </p:sp>
+      <p:sp>
+        <p:nvSpPr>
+          <p:cNvPr id="67" name="Ellipse 66"/>
+          <p:cNvSpPr/>
+          <p:nvPr/>
+        </p:nvSpPr>
+        <p:spPr>
+          <a:xfrm>
+            <a:off x="8534924" y="1918051"/>
+            <a:ext cx="144734" cy="150637"/>
+          </a:xfrm>
+          <a:prstGeom prst="ellipse">
+            <a:avLst/>
+          </a:prstGeom>
+          <a:solidFill>
+            <a:schemeClr val="bg1"/>
+          </a:solidFill>
+          <a:ln>
+            <a:solidFill>
+              <a:schemeClr val="tx1"/>
+            </a:solidFill>
+          </a:ln>
+        </p:spPr>
+        <p:style>
+          <a:lnRef idx="2">
+            <a:schemeClr val="accent1">
+              <a:shade val="50000"/>
+            </a:schemeClr>
+          </a:lnRef>
+          <a:fillRef idx="1">
+            <a:schemeClr val="accent1"/>
+          </a:fillRef>
+          <a:effectRef idx="0">
+            <a:schemeClr val="accent1"/>
+          </a:effectRef>
+          <a:fontRef idx="minor">
+            <a:schemeClr val="lt1"/>
+          </a:fontRef>
+        </p:style>
+        <p:txBody>
+          <a:bodyPr rtlCol="0" anchor="ctr"/>
+          <a:lstStyle/>
+          <a:p>
+            <a:pPr algn="ctr"/>
+            <a:endParaRPr lang="en-US"/>
+          </a:p>
+        </p:txBody>
+      </p:sp>
+      <p:sp>
+        <p:nvSpPr>
+          <p:cNvPr id="68" name="Ellipse 67"/>
+          <p:cNvSpPr/>
+          <p:nvPr/>
+        </p:nvSpPr>
+        <p:spPr>
+          <a:xfrm>
+            <a:off x="8534923" y="2140630"/>
+            <a:ext cx="144734" cy="150637"/>
+          </a:xfrm>
+          <a:prstGeom prst="ellipse">
+            <a:avLst/>
+          </a:prstGeom>
+          <a:solidFill>
+            <a:srgbClr val="00B050"/>
+          </a:solidFill>
+          <a:ln>
+            <a:solidFill>
+              <a:schemeClr val="tx1"/>
+            </a:solidFill>
+          </a:ln>
+        </p:spPr>
+        <p:style>
+          <a:lnRef idx="2">
+            <a:schemeClr val="accent1">
+              <a:shade val="50000"/>
+            </a:schemeClr>
+          </a:lnRef>
+          <a:fillRef idx="1">
+            <a:schemeClr val="accent1"/>
+          </a:fillRef>
+          <a:effectRef idx="0">
+            <a:schemeClr val="accent1"/>
+          </a:effectRef>
+          <a:fontRef idx="minor">
+            <a:schemeClr val="lt1"/>
+          </a:fontRef>
+        </p:style>
+        <p:txBody>
+          <a:bodyPr rtlCol="0" anchor="ctr"/>
+          <a:lstStyle/>
+          <a:p>
+            <a:pPr algn="ctr"/>
+            <a:endParaRPr lang="en-US"/>
           </a:p>
         </p:txBody>
       </p:sp>

</xml_diff>